<commit_message>
Edited minor cosmetic errors
</commit_message>
<xml_diff>
--- a/docs/diagrams/HighLevelSequenceDiagrams.pptx
+++ b/docs/diagrams/HighLevelSequenceDiagrams.pptx
@@ -107,6 +107,22 @@
       </a:defRPr>
     </a:lvl9pPr>
   </p:defaultTextStyle>
+  <p:extLst>
+    <p:ext uri="{EFAFB233-063F-42B5-8137-9DF3F51BA10A}">
+      <p15:sldGuideLst xmlns:p15="http://schemas.microsoft.com/office/powerpoint/2012/main">
+        <p15:guide id="1" orient="horz" pos="1488">
+          <p15:clr>
+            <a:srgbClr val="A4A3A4"/>
+          </p15:clr>
+        </p15:guide>
+        <p15:guide id="2" pos="2880">
+          <p15:clr>
+            <a:srgbClr val="A4A3A4"/>
+          </p15:clr>
+        </p15:guide>
+      </p15:sldGuideLst>
+    </p:ext>
+  </p:extLst>
 </p:presentation>
 </file>
 
@@ -192,7 +208,7 @@
           <a:p>
             <a:fld id="{F5CC4B3F-88C1-4FFA-B1B6-F41C21DC6924}" type="datetimeFigureOut">
               <a:rPr lang="en-US" smtClean="0"/>
-              <a:t>10/16/2016</a:t>
+              <a:t>3/23/17</a:t>
             </a:fld>
             <a:endParaRPr lang="en-US"/>
           </a:p>
@@ -641,7 +657,7 @@
           <a:p>
             <a:fld id="{78C97017-6FC3-485B-9764-EAC9E56C1D49}" type="datetimeFigureOut">
               <a:rPr lang="en-US" smtClean="0"/>
-              <a:t>10/16/2016</a:t>
+              <a:t>3/23/17</a:t>
             </a:fld>
             <a:endParaRPr lang="en-US"/>
           </a:p>
@@ -811,7 +827,7 @@
           <a:p>
             <a:fld id="{78C97017-6FC3-485B-9764-EAC9E56C1D49}" type="datetimeFigureOut">
               <a:rPr lang="en-US" smtClean="0"/>
-              <a:t>10/16/2016</a:t>
+              <a:t>3/23/17</a:t>
             </a:fld>
             <a:endParaRPr lang="en-US"/>
           </a:p>
@@ -991,7 +1007,7 @@
           <a:p>
             <a:fld id="{78C97017-6FC3-485B-9764-EAC9E56C1D49}" type="datetimeFigureOut">
               <a:rPr lang="en-US" smtClean="0"/>
-              <a:t>10/16/2016</a:t>
+              <a:t>3/23/17</a:t>
             </a:fld>
             <a:endParaRPr lang="en-US"/>
           </a:p>
@@ -1161,7 +1177,7 @@
           <a:p>
             <a:fld id="{78C97017-6FC3-485B-9764-EAC9E56C1D49}" type="datetimeFigureOut">
               <a:rPr lang="en-US" smtClean="0"/>
-              <a:t>10/16/2016</a:t>
+              <a:t>3/23/17</a:t>
             </a:fld>
             <a:endParaRPr lang="en-US"/>
           </a:p>
@@ -1407,7 +1423,7 @@
           <a:p>
             <a:fld id="{78C97017-6FC3-485B-9764-EAC9E56C1D49}" type="datetimeFigureOut">
               <a:rPr lang="en-US" smtClean="0"/>
-              <a:t>10/16/2016</a:t>
+              <a:t>3/23/17</a:t>
             </a:fld>
             <a:endParaRPr lang="en-US"/>
           </a:p>
@@ -1695,7 +1711,7 @@
           <a:p>
             <a:fld id="{78C97017-6FC3-485B-9764-EAC9E56C1D49}" type="datetimeFigureOut">
               <a:rPr lang="en-US" smtClean="0"/>
-              <a:t>10/16/2016</a:t>
+              <a:t>3/23/17</a:t>
             </a:fld>
             <a:endParaRPr lang="en-US"/>
           </a:p>
@@ -2117,7 +2133,7 @@
           <a:p>
             <a:fld id="{78C97017-6FC3-485B-9764-EAC9E56C1D49}" type="datetimeFigureOut">
               <a:rPr lang="en-US" smtClean="0"/>
-              <a:t>10/16/2016</a:t>
+              <a:t>3/23/17</a:t>
             </a:fld>
             <a:endParaRPr lang="en-US"/>
           </a:p>
@@ -2235,7 +2251,7 @@
           <a:p>
             <a:fld id="{78C97017-6FC3-485B-9764-EAC9E56C1D49}" type="datetimeFigureOut">
               <a:rPr lang="en-US" smtClean="0"/>
-              <a:t>10/16/2016</a:t>
+              <a:t>3/23/17</a:t>
             </a:fld>
             <a:endParaRPr lang="en-US"/>
           </a:p>
@@ -2330,7 +2346,7 @@
           <a:p>
             <a:fld id="{78C97017-6FC3-485B-9764-EAC9E56C1D49}" type="datetimeFigureOut">
               <a:rPr lang="en-US" smtClean="0"/>
-              <a:t>10/16/2016</a:t>
+              <a:t>3/23/17</a:t>
             </a:fld>
             <a:endParaRPr lang="en-US"/>
           </a:p>
@@ -2607,7 +2623,7 @@
           <a:p>
             <a:fld id="{78C97017-6FC3-485B-9764-EAC9E56C1D49}" type="datetimeFigureOut">
               <a:rPr lang="en-US" smtClean="0"/>
-              <a:t>10/16/2016</a:t>
+              <a:t>3/23/17</a:t>
             </a:fld>
             <a:endParaRPr lang="en-US"/>
           </a:p>
@@ -2860,7 +2876,7 @@
           <a:p>
             <a:fld id="{78C97017-6FC3-485B-9764-EAC9E56C1D49}" type="datetimeFigureOut">
               <a:rPr lang="en-US" smtClean="0"/>
-              <a:t>10/16/2016</a:t>
+              <a:t>3/23/17</a:t>
             </a:fld>
             <a:endParaRPr lang="en-US"/>
           </a:p>
@@ -3073,7 +3089,7 @@
           <a:p>
             <a:fld id="{78C97017-6FC3-485B-9764-EAC9E56C1D49}" type="datetimeFigureOut">
               <a:rPr lang="en-US" smtClean="0"/>
-              <a:t>10/16/2016</a:t>
+              <a:t>3/23/17</a:t>
             </a:fld>
             <a:endParaRPr lang="en-US"/>
           </a:p>
@@ -4336,8 +4352,8 @@
         </p:nvSpPr>
         <p:spPr>
           <a:xfrm>
-            <a:off x="6074030" y="1687656"/>
-            <a:ext cx="2438400" cy="215444"/>
+            <a:off x="5867400" y="1679146"/>
+            <a:ext cx="2819400" cy="215444"/>
           </a:xfrm>
           <a:prstGeom prst="rect">
             <a:avLst/>
@@ -4350,6 +4366,7 @@
           </a:bodyPr>
           <a:lstStyle/>
           <a:p>
+            <a:pPr algn="ctr"/>
             <a:r>
               <a:rPr lang="en-US" sz="1400" dirty="0" smtClean="0">
                 <a:solidFill>
@@ -4368,7 +4385,7 @@
                   </a:schemeClr>
                 </a:solidFill>
               </a:rPr>
-              <a:t>AddressBookChangedEvent</a:t>
+              <a:t>TaskManagerChangedEvent</a:t>
             </a:r>
             <a:r>
               <a:rPr lang="en-US" sz="1400" dirty="0" smtClean="0">
@@ -4910,8 +4927,8 @@
         </p:nvSpPr>
         <p:spPr>
           <a:xfrm>
-            <a:off x="1810094" y="4797674"/>
-            <a:ext cx="2716635" cy="215444"/>
+            <a:off x="1489248" y="4797674"/>
+            <a:ext cx="3037482" cy="213887"/>
           </a:xfrm>
           <a:prstGeom prst="rect">
             <a:avLst/>
@@ -4924,6 +4941,7 @@
           </a:bodyPr>
           <a:lstStyle/>
           <a:p>
+            <a:pPr algn="ctr"/>
             <a:r>
               <a:rPr lang="en-US" sz="1400" dirty="0" smtClean="0">
                 <a:solidFill>
@@ -4942,7 +4960,7 @@
                   </a:schemeClr>
                 </a:solidFill>
               </a:rPr>
-              <a:t>AddressBookChangedEvent</a:t>
+              <a:t>TaskManagerChangedEvent</a:t>
             </a:r>
             <a:r>
               <a:rPr lang="en-US" sz="1400" dirty="0" smtClean="0">
@@ -5052,7 +5070,7 @@
           <a:p>
             <a:pPr algn="ctr"/>
             <a:r>
-              <a:rPr lang="en-US" sz="1600" dirty="0" smtClean="0">
+              <a:rPr lang="en-US" sz="1600" smtClean="0">
                 <a:solidFill>
                   <a:schemeClr val="bg1"/>
                 </a:solidFill>
@@ -5292,8 +5310,8 @@
         </p:nvSpPr>
         <p:spPr>
           <a:xfrm>
-            <a:off x="5036330" y="5065911"/>
-            <a:ext cx="2659870" cy="215444"/>
+            <a:off x="4781217" y="5065911"/>
+            <a:ext cx="2914983" cy="215444"/>
           </a:xfrm>
           <a:prstGeom prst="rect">
             <a:avLst/>
@@ -5306,6 +5324,7 @@
           </a:bodyPr>
           <a:lstStyle/>
           <a:p>
+            <a:pPr algn="ctr"/>
             <a:r>
               <a:rPr lang="en-US" sz="1400" dirty="0" err="1" smtClean="0">
                 <a:solidFill>
@@ -5314,7 +5333,7 @@
                   </a:schemeClr>
                 </a:solidFill>
               </a:rPr>
-              <a:t>handleAddresssBookChangedEvent</a:t>
+              <a:t>handleTaskManagerChangedEvent</a:t>
             </a:r>
             <a:r>
               <a:rPr lang="en-US" sz="1400" dirty="0" smtClean="0">
@@ -5605,8 +5624,8 @@
         </p:nvSpPr>
         <p:spPr>
           <a:xfrm>
-            <a:off x="1416276" y="5395369"/>
-            <a:ext cx="2659870" cy="215444"/>
+            <a:off x="1355853" y="5397344"/>
+            <a:ext cx="2970333" cy="213899"/>
           </a:xfrm>
           <a:prstGeom prst="rect">
             <a:avLst/>
@@ -5619,13 +5638,14 @@
           </a:bodyPr>
           <a:lstStyle/>
           <a:p>
+            <a:pPr algn="ctr"/>
             <a:r>
               <a:rPr lang="en-US" sz="1400" dirty="0" err="1" smtClean="0">
                 <a:solidFill>
                   <a:srgbClr val="00B050"/>
                 </a:solidFill>
               </a:rPr>
-              <a:t>handleAddresssBookChangedEvent</a:t>
+              <a:t>handleTaskManagerChangedEvent</a:t>
             </a:r>
             <a:r>
               <a:rPr lang="en-US" sz="1400" dirty="0" smtClean="0">
@@ -6062,6 +6082,32 @@
                 </a:schemeClr>
               </a:solidFill>
             </a:endParaRPr>
+          </a:p>
+        </p:txBody>
+      </p:sp>
+      <p:sp>
+        <p:nvSpPr>
+          <p:cNvPr id="3" name="TextBox 2"/>
+          <p:cNvSpPr txBox="1"/>
+          <p:nvPr/>
+        </p:nvSpPr>
+        <p:spPr>
+          <a:xfrm>
+            <a:off x="-431800" y="3708400"/>
+            <a:ext cx="184731" cy="369332"/>
+          </a:xfrm>
+          <a:prstGeom prst="rect">
+            <a:avLst/>
+          </a:prstGeom>
+          <a:noFill/>
+        </p:spPr>
+        <p:txBody>
+          <a:bodyPr wrap="none" rtlCol="0">
+            <a:spAutoFit/>
+          </a:bodyPr>
+          <a:lstStyle/>
+          <a:p>
+            <a:endParaRPr lang="en-US" dirty="0"/>
           </a:p>
         </p:txBody>
       </p:sp>

</xml_diff>

<commit_message>
changed logic class diagram
</commit_message>
<xml_diff>
--- a/docs/diagrams/HighLevelSequenceDiagrams.pptx
+++ b/docs/diagrams/HighLevelSequenceDiagrams.pptx
@@ -208,7 +208,7 @@
           <a:p>
             <a:fld id="{F5CC4B3F-88C1-4FFA-B1B6-F41C21DC6924}" type="datetimeFigureOut">
               <a:rPr lang="en-US" smtClean="0"/>
-              <a:t>3/23/17</a:t>
+              <a:t>4/6/17</a:t>
             </a:fld>
             <a:endParaRPr lang="en-US"/>
           </a:p>
@@ -657,7 +657,7 @@
           <a:p>
             <a:fld id="{78C97017-6FC3-485B-9764-EAC9E56C1D49}" type="datetimeFigureOut">
               <a:rPr lang="en-US" smtClean="0"/>
-              <a:t>3/23/17</a:t>
+              <a:t>4/6/17</a:t>
             </a:fld>
             <a:endParaRPr lang="en-US"/>
           </a:p>
@@ -827,7 +827,7 @@
           <a:p>
             <a:fld id="{78C97017-6FC3-485B-9764-EAC9E56C1D49}" type="datetimeFigureOut">
               <a:rPr lang="en-US" smtClean="0"/>
-              <a:t>3/23/17</a:t>
+              <a:t>4/6/17</a:t>
             </a:fld>
             <a:endParaRPr lang="en-US"/>
           </a:p>
@@ -1007,7 +1007,7 @@
           <a:p>
             <a:fld id="{78C97017-6FC3-485B-9764-EAC9E56C1D49}" type="datetimeFigureOut">
               <a:rPr lang="en-US" smtClean="0"/>
-              <a:t>3/23/17</a:t>
+              <a:t>4/6/17</a:t>
             </a:fld>
             <a:endParaRPr lang="en-US"/>
           </a:p>
@@ -1177,7 +1177,7 @@
           <a:p>
             <a:fld id="{78C97017-6FC3-485B-9764-EAC9E56C1D49}" type="datetimeFigureOut">
               <a:rPr lang="en-US" smtClean="0"/>
-              <a:t>3/23/17</a:t>
+              <a:t>4/6/17</a:t>
             </a:fld>
             <a:endParaRPr lang="en-US"/>
           </a:p>
@@ -1423,7 +1423,7 @@
           <a:p>
             <a:fld id="{78C97017-6FC3-485B-9764-EAC9E56C1D49}" type="datetimeFigureOut">
               <a:rPr lang="en-US" smtClean="0"/>
-              <a:t>3/23/17</a:t>
+              <a:t>4/6/17</a:t>
             </a:fld>
             <a:endParaRPr lang="en-US"/>
           </a:p>
@@ -1711,7 +1711,7 @@
           <a:p>
             <a:fld id="{78C97017-6FC3-485B-9764-EAC9E56C1D49}" type="datetimeFigureOut">
               <a:rPr lang="en-US" smtClean="0"/>
-              <a:t>3/23/17</a:t>
+              <a:t>4/6/17</a:t>
             </a:fld>
             <a:endParaRPr lang="en-US"/>
           </a:p>
@@ -2133,7 +2133,7 @@
           <a:p>
             <a:fld id="{78C97017-6FC3-485B-9764-EAC9E56C1D49}" type="datetimeFigureOut">
               <a:rPr lang="en-US" smtClean="0"/>
-              <a:t>3/23/17</a:t>
+              <a:t>4/6/17</a:t>
             </a:fld>
             <a:endParaRPr lang="en-US"/>
           </a:p>
@@ -2251,7 +2251,7 @@
           <a:p>
             <a:fld id="{78C97017-6FC3-485B-9764-EAC9E56C1D49}" type="datetimeFigureOut">
               <a:rPr lang="en-US" smtClean="0"/>
-              <a:t>3/23/17</a:t>
+              <a:t>4/6/17</a:t>
             </a:fld>
             <a:endParaRPr lang="en-US"/>
           </a:p>
@@ -2346,7 +2346,7 @@
           <a:p>
             <a:fld id="{78C97017-6FC3-485B-9764-EAC9E56C1D49}" type="datetimeFigureOut">
               <a:rPr lang="en-US" smtClean="0"/>
-              <a:t>3/23/17</a:t>
+              <a:t>4/6/17</a:t>
             </a:fld>
             <a:endParaRPr lang="en-US"/>
           </a:p>
@@ -2623,7 +2623,7 @@
           <a:p>
             <a:fld id="{78C97017-6FC3-485B-9764-EAC9E56C1D49}" type="datetimeFigureOut">
               <a:rPr lang="en-US" smtClean="0"/>
-              <a:t>3/23/17</a:t>
+              <a:t>4/6/17</a:t>
             </a:fld>
             <a:endParaRPr lang="en-US"/>
           </a:p>
@@ -2876,7 +2876,7 @@
           <a:p>
             <a:fld id="{78C97017-6FC3-485B-9764-EAC9E56C1D49}" type="datetimeFigureOut">
               <a:rPr lang="en-US" smtClean="0"/>
-              <a:t>3/23/17</a:t>
+              <a:t>4/6/17</a:t>
             </a:fld>
             <a:endParaRPr lang="en-US"/>
           </a:p>
@@ -3089,7 +3089,7 @@
           <a:p>
             <a:fld id="{78C97017-6FC3-485B-9764-EAC9E56C1D49}" type="datetimeFigureOut">
               <a:rPr lang="en-US" smtClean="0"/>
-              <a:t>3/23/17</a:t>
+              <a:t>4/6/17</a:t>
             </a:fld>
             <a:endParaRPr lang="en-US"/>
           </a:p>
@@ -4326,7 +4326,7 @@
                   <a:srgbClr val="7030A0"/>
                 </a:solidFill>
               </a:rPr>
-              <a:t>deletePerson</a:t>
+              <a:t>deleteTask</a:t>
             </a:r>
             <a:r>
               <a:rPr lang="en-US" sz="1400" dirty="0" smtClean="0">
@@ -4334,7 +4334,15 @@
                   <a:srgbClr val="7030A0"/>
                 </a:solidFill>
               </a:rPr>
-              <a:t>(p)</a:t>
+              <a:t>(p</a:t>
+            </a:r>
+            <a:r>
+              <a:rPr lang="en-US" sz="1400" dirty="0" smtClean="0">
+                <a:solidFill>
+                  <a:srgbClr val="7030A0"/>
+                </a:solidFill>
+              </a:rPr>
+              <a:t>)</a:t>
             </a:r>
             <a:endParaRPr lang="en-US" sz="1400" dirty="0">
               <a:solidFill>

</xml_diff>